<commit_message>
Final commit software semester 6
</commit_message>
<xml_diff>
--- a/Documentatie/Sprint 5/sprint 5 presentation.pptx
+++ b/Documentatie/Sprint 5/sprint 5 presentation.pptx
@@ -5,19 +5,20 @@
     <p:sldMasterId id="2147483660" r:id="rId1"/>
   </p:sldMasterIdLst>
   <p:notesMasterIdLst>
-    <p:notesMasterId r:id="rId12"/>
+    <p:notesMasterId r:id="rId13"/>
   </p:notesMasterIdLst>
   <p:sldIdLst>
     <p:sldId id="256" r:id="rId2"/>
     <p:sldId id="257" r:id="rId3"/>
     <p:sldId id="263" r:id="rId4"/>
-    <p:sldId id="258" r:id="rId5"/>
+    <p:sldId id="278" r:id="rId5"/>
     <p:sldId id="267" r:id="rId6"/>
     <p:sldId id="271" r:id="rId7"/>
     <p:sldId id="277" r:id="rId8"/>
     <p:sldId id="274" r:id="rId9"/>
     <p:sldId id="276" r:id="rId10"/>
-    <p:sldId id="262" r:id="rId11"/>
+    <p:sldId id="279" r:id="rId11"/>
+    <p:sldId id="262" r:id="rId12"/>
   </p:sldIdLst>
   <p:sldSz cx="12192000" cy="6858000"/>
   <p:notesSz cx="6858000" cy="9144000"/>
@@ -472,6 +473,90 @@
     </a:lvl9pPr>
   </p:notesStyle>
 </p:notesMaster>
+</file>
+
+<file path=ppt/notesSlides/notesSlide1.xml><?xml version="1.0" encoding="utf-8"?>
+<p:notes xmlns:a="http://schemas.openxmlformats.org/drawingml/2006/main" xmlns:r="http://schemas.openxmlformats.org/officeDocument/2006/relationships" xmlns:p="http://schemas.openxmlformats.org/presentationml/2006/main">
+  <p:cSld>
+    <p:spTree>
+      <p:nvGrpSpPr>
+        <p:cNvPr id="1" name=""/>
+        <p:cNvGrpSpPr/>
+        <p:nvPr/>
+      </p:nvGrpSpPr>
+      <p:grpSpPr>
+        <a:xfrm>
+          <a:off x="0" y="0"/>
+          <a:ext cx="0" cy="0"/>
+          <a:chOff x="0" y="0"/>
+          <a:chExt cx="0" cy="0"/>
+        </a:xfrm>
+      </p:grpSpPr>
+      <p:sp>
+        <p:nvSpPr>
+          <p:cNvPr id="2" name="Slide Image Placeholder 1"/>
+          <p:cNvSpPr>
+            <a:spLocks noGrp="1" noRot="1" noChangeAspect="1"/>
+          </p:cNvSpPr>
+          <p:nvPr>
+            <p:ph type="sldImg"/>
+          </p:nvPr>
+        </p:nvSpPr>
+        <p:spPr/>
+      </p:sp>
+      <p:sp>
+        <p:nvSpPr>
+          <p:cNvPr id="3" name="Notes Placeholder 2"/>
+          <p:cNvSpPr>
+            <a:spLocks noGrp="1"/>
+          </p:cNvSpPr>
+          <p:nvPr>
+            <p:ph type="body" idx="1"/>
+          </p:nvPr>
+        </p:nvSpPr>
+        <p:spPr/>
+        <p:txBody>
+          <a:bodyPr/>
+          <a:lstStyle/>
+          <a:p>
+            <a:endParaRPr lang="en-NL" dirty="0"/>
+          </a:p>
+        </p:txBody>
+      </p:sp>
+      <p:sp>
+        <p:nvSpPr>
+          <p:cNvPr id="4" name="Slide Number Placeholder 3"/>
+          <p:cNvSpPr>
+            <a:spLocks noGrp="1"/>
+          </p:cNvSpPr>
+          <p:nvPr>
+            <p:ph type="sldNum" sz="quarter" idx="5"/>
+          </p:nvPr>
+        </p:nvSpPr>
+        <p:spPr/>
+        <p:txBody>
+          <a:bodyPr/>
+          <a:lstStyle/>
+          <a:p>
+            <a:fld id="{305DE023-EE75-439B-8548-0C06C960C857}" type="slidenum">
+              <a:rPr lang="en-NL" smtClean="0"/>
+              <a:t>11</a:t>
+            </a:fld>
+            <a:endParaRPr lang="en-NL"/>
+          </a:p>
+        </p:txBody>
+      </p:sp>
+    </p:spTree>
+    <p:extLst>
+      <p:ext uri="{BB962C8B-B14F-4D97-AF65-F5344CB8AC3E}">
+        <p14:creationId xmlns:p14="http://schemas.microsoft.com/office/powerpoint/2010/main" val="940014383"/>
+      </p:ext>
+    </p:extLst>
+  </p:cSld>
+  <p:clrMapOvr>
+    <a:masterClrMapping/>
+  </p:clrMapOvr>
+</p:notes>
 </file>
 
 <file path=ppt/slideLayouts/slideLayout1.xml><?xml version="1.0" encoding="utf-8"?>
@@ -6596,6 +6681,70 @@
           <p:cNvPr id="2" name="Title 1">
             <a:extLst>
               <a:ext uri="{FF2B5EF4-FFF2-40B4-BE49-F238E27FC236}">
+                <a16:creationId xmlns:a16="http://schemas.microsoft.com/office/drawing/2014/main" id="{2BB2FE88-E9CF-D3B8-9F2B-A24F4A8FD9EB}"/>
+              </a:ext>
+            </a:extLst>
+          </p:cNvPr>
+          <p:cNvSpPr>
+            <a:spLocks noGrp="1"/>
+          </p:cNvSpPr>
+          <p:nvPr>
+            <p:ph type="title"/>
+          </p:nvPr>
+        </p:nvSpPr>
+        <p:spPr>
+          <a:xfrm>
+            <a:off x="-2088517" y="1036118"/>
+            <a:ext cx="10364451" cy="1596177"/>
+          </a:xfrm>
+        </p:spPr>
+        <p:txBody>
+          <a:bodyPr/>
+          <a:lstStyle/>
+          <a:p>
+            <a:r>
+              <a:rPr lang="en-US" dirty="0"/>
+              <a:t>Demo</a:t>
+            </a:r>
+            <a:endParaRPr lang="en-NL" dirty="0"/>
+          </a:p>
+        </p:txBody>
+      </p:sp>
+    </p:spTree>
+    <p:extLst>
+      <p:ext uri="{BB962C8B-B14F-4D97-AF65-F5344CB8AC3E}">
+        <p14:creationId xmlns:p14="http://schemas.microsoft.com/office/powerpoint/2010/main" val="627147162"/>
+      </p:ext>
+    </p:extLst>
+  </p:cSld>
+  <p:clrMapOvr>
+    <a:masterClrMapping/>
+  </p:clrMapOvr>
+</p:sld>
+</file>
+
+<file path=ppt/slides/slide11.xml><?xml version="1.0" encoding="utf-8"?>
+<p:sld xmlns:a="http://schemas.openxmlformats.org/drawingml/2006/main" xmlns:r="http://schemas.openxmlformats.org/officeDocument/2006/relationships" xmlns:p="http://schemas.openxmlformats.org/presentationml/2006/main">
+  <p:cSld>
+    <p:spTree>
+      <p:nvGrpSpPr>
+        <p:cNvPr id="1" name=""/>
+        <p:cNvGrpSpPr/>
+        <p:nvPr/>
+      </p:nvGrpSpPr>
+      <p:grpSpPr>
+        <a:xfrm>
+          <a:off x="0" y="0"/>
+          <a:ext cx="0" cy="0"/>
+          <a:chOff x="0" y="0"/>
+          <a:chExt cx="0" cy="0"/>
+        </a:xfrm>
+      </p:grpSpPr>
+      <p:sp>
+        <p:nvSpPr>
+          <p:cNvPr id="2" name="Title 1">
+            <a:extLst>
+              <a:ext uri="{FF2B5EF4-FFF2-40B4-BE49-F238E27FC236}">
                 <a16:creationId xmlns:a16="http://schemas.microsoft.com/office/drawing/2014/main" id="{BD06798B-3D1A-7855-A69C-9AF639528C4C}"/>
               </a:ext>
             </a:extLst>
@@ -6613,8 +6762,8 @@
           <a:lstStyle/>
           <a:p>
             <a:r>
-              <a:rPr lang="en-US" dirty="0" err="1"/>
-              <a:t>Conclusie</a:t>
+              <a:rPr lang="en-US" dirty="0"/>
+              <a:t>Self Assessment</a:t>
             </a:r>
             <a:endParaRPr lang="en-NL" dirty="0"/>
           </a:p>
@@ -6647,6 +6796,532 @@
           <a:lstStyle/>
           <a:p>
             <a:endParaRPr lang="en-US" dirty="0"/>
+          </a:p>
+        </p:txBody>
+      </p:sp>
+      <p:pic>
+        <p:nvPicPr>
+          <p:cNvPr id="4" name="Picture 3">
+            <a:extLst>
+              <a:ext uri="{FF2B5EF4-FFF2-40B4-BE49-F238E27FC236}">
+                <a16:creationId xmlns:a16="http://schemas.microsoft.com/office/drawing/2014/main" id="{5E73761B-DF4A-DFFD-3151-BED87734FC3D}"/>
+              </a:ext>
+            </a:extLst>
+          </p:cNvPr>
+          <p:cNvPicPr>
+            <a:picLocks noChangeAspect="1"/>
+          </p:cNvPicPr>
+          <p:nvPr/>
+        </p:nvPicPr>
+        <p:blipFill rotWithShape="1">
+          <a:blip r:embed="rId3"/>
+          <a:srcRect r="1520"/>
+          <a:stretch/>
+        </p:blipFill>
+        <p:spPr>
+          <a:xfrm>
+            <a:off x="5355274" y="2214694"/>
+            <a:ext cx="6716834" cy="4587638"/>
+          </a:xfrm>
+          <a:prstGeom prst="rect">
+            <a:avLst/>
+          </a:prstGeom>
+        </p:spPr>
+      </p:pic>
+      <p:pic>
+        <p:nvPicPr>
+          <p:cNvPr id="7" name="Picture 6">
+            <a:extLst>
+              <a:ext uri="{FF2B5EF4-FFF2-40B4-BE49-F238E27FC236}">
+                <a16:creationId xmlns:a16="http://schemas.microsoft.com/office/drawing/2014/main" id="{69C2F192-4808-ADF6-4AB7-AF6515D540EF}"/>
+              </a:ext>
+            </a:extLst>
+          </p:cNvPr>
+          <p:cNvPicPr>
+            <a:picLocks noChangeAspect="1"/>
+          </p:cNvPicPr>
+          <p:nvPr/>
+        </p:nvPicPr>
+        <p:blipFill rotWithShape="1">
+          <a:blip r:embed="rId4"/>
+          <a:srcRect r="23150"/>
+          <a:stretch/>
+        </p:blipFill>
+        <p:spPr>
+          <a:xfrm>
+            <a:off x="104175" y="2367092"/>
+            <a:ext cx="5206354" cy="4168501"/>
+          </a:xfrm>
+          <a:prstGeom prst="rect">
+            <a:avLst/>
+          </a:prstGeom>
+        </p:spPr>
+      </p:pic>
+      <p:sp>
+        <p:nvSpPr>
+          <p:cNvPr id="8" name="Rectangle: Rounded Corners 7">
+            <a:extLst>
+              <a:ext uri="{FF2B5EF4-FFF2-40B4-BE49-F238E27FC236}">
+                <a16:creationId xmlns:a16="http://schemas.microsoft.com/office/drawing/2014/main" id="{09E6AD1B-E3BE-88C8-65AD-75F084D9D191}"/>
+              </a:ext>
+            </a:extLst>
+          </p:cNvPr>
+          <p:cNvSpPr/>
+          <p:nvPr/>
+        </p:nvSpPr>
+        <p:spPr>
+          <a:xfrm>
+            <a:off x="6888480" y="2296586"/>
+            <a:ext cx="707136" cy="810769"/>
+          </a:xfrm>
+          <a:prstGeom prst="roundRect">
+            <a:avLst/>
+          </a:prstGeom>
+          <a:solidFill>
+            <a:schemeClr val="accent2">
+              <a:alpha val="50000"/>
+            </a:schemeClr>
+          </a:solidFill>
+          <a:ln>
+            <a:noFill/>
+          </a:ln>
+        </p:spPr>
+        <p:style>
+          <a:lnRef idx="0">
+            <a:scrgbClr r="0" g="0" b="0"/>
+          </a:lnRef>
+          <a:fillRef idx="0">
+            <a:scrgbClr r="0" g="0" b="0"/>
+          </a:fillRef>
+          <a:effectRef idx="0">
+            <a:scrgbClr r="0" g="0" b="0"/>
+          </a:effectRef>
+          <a:fontRef idx="minor">
+            <a:schemeClr val="lt1"/>
+          </a:fontRef>
+        </p:style>
+        <p:txBody>
+          <a:bodyPr rtlCol="0" anchor="ctr"/>
+          <a:lstStyle/>
+          <a:p>
+            <a:pPr algn="ctr"/>
+            <a:endParaRPr lang="en-NL"/>
+          </a:p>
+        </p:txBody>
+      </p:sp>
+      <p:sp>
+        <p:nvSpPr>
+          <p:cNvPr id="9" name="Rectangle: Rounded Corners 8">
+            <a:extLst>
+              <a:ext uri="{FF2B5EF4-FFF2-40B4-BE49-F238E27FC236}">
+                <a16:creationId xmlns:a16="http://schemas.microsoft.com/office/drawing/2014/main" id="{4D982004-6FF4-A0C1-60B0-3672DB991649}"/>
+              </a:ext>
+            </a:extLst>
+          </p:cNvPr>
+          <p:cNvSpPr/>
+          <p:nvPr/>
+        </p:nvSpPr>
+        <p:spPr>
+          <a:xfrm>
+            <a:off x="7644384" y="3262802"/>
+            <a:ext cx="707136" cy="810769"/>
+          </a:xfrm>
+          <a:prstGeom prst="roundRect">
+            <a:avLst/>
+          </a:prstGeom>
+          <a:solidFill>
+            <a:schemeClr val="accent2">
+              <a:alpha val="50000"/>
+            </a:schemeClr>
+          </a:solidFill>
+          <a:ln>
+            <a:noFill/>
+          </a:ln>
+        </p:spPr>
+        <p:style>
+          <a:lnRef idx="0">
+            <a:scrgbClr r="0" g="0" b="0"/>
+          </a:lnRef>
+          <a:fillRef idx="0">
+            <a:scrgbClr r="0" g="0" b="0"/>
+          </a:fillRef>
+          <a:effectRef idx="0">
+            <a:scrgbClr r="0" g="0" b="0"/>
+          </a:effectRef>
+          <a:fontRef idx="minor">
+            <a:schemeClr val="lt1"/>
+          </a:fontRef>
+        </p:style>
+        <p:txBody>
+          <a:bodyPr rtlCol="0" anchor="ctr"/>
+          <a:lstStyle/>
+          <a:p>
+            <a:pPr algn="ctr"/>
+            <a:endParaRPr lang="en-NL"/>
+          </a:p>
+        </p:txBody>
+      </p:sp>
+      <p:sp>
+        <p:nvSpPr>
+          <p:cNvPr id="10" name="Rectangle: Rounded Corners 9">
+            <a:extLst>
+              <a:ext uri="{FF2B5EF4-FFF2-40B4-BE49-F238E27FC236}">
+                <a16:creationId xmlns:a16="http://schemas.microsoft.com/office/drawing/2014/main" id="{231AA812-8317-0568-4552-ECFFBAF3B543}"/>
+              </a:ext>
+            </a:extLst>
+          </p:cNvPr>
+          <p:cNvSpPr/>
+          <p:nvPr/>
+        </p:nvSpPr>
+        <p:spPr>
+          <a:xfrm>
+            <a:off x="6888480" y="4206239"/>
+            <a:ext cx="707136" cy="810769"/>
+          </a:xfrm>
+          <a:prstGeom prst="roundRect">
+            <a:avLst/>
+          </a:prstGeom>
+          <a:solidFill>
+            <a:schemeClr val="accent2">
+              <a:alpha val="50000"/>
+            </a:schemeClr>
+          </a:solidFill>
+          <a:ln>
+            <a:noFill/>
+          </a:ln>
+        </p:spPr>
+        <p:style>
+          <a:lnRef idx="0">
+            <a:scrgbClr r="0" g="0" b="0"/>
+          </a:lnRef>
+          <a:fillRef idx="0">
+            <a:scrgbClr r="0" g="0" b="0"/>
+          </a:fillRef>
+          <a:effectRef idx="0">
+            <a:scrgbClr r="0" g="0" b="0"/>
+          </a:effectRef>
+          <a:fontRef idx="minor">
+            <a:schemeClr val="lt1"/>
+          </a:fontRef>
+        </p:style>
+        <p:txBody>
+          <a:bodyPr rtlCol="0" anchor="ctr"/>
+          <a:lstStyle/>
+          <a:p>
+            <a:pPr algn="ctr"/>
+            <a:endParaRPr lang="en-NL"/>
+          </a:p>
+        </p:txBody>
+      </p:sp>
+      <p:sp>
+        <p:nvSpPr>
+          <p:cNvPr id="11" name="Rectangle: Rounded Corners 10">
+            <a:extLst>
+              <a:ext uri="{FF2B5EF4-FFF2-40B4-BE49-F238E27FC236}">
+                <a16:creationId xmlns:a16="http://schemas.microsoft.com/office/drawing/2014/main" id="{BC9BA49E-94B1-1847-4167-CB08EF39587F}"/>
+              </a:ext>
+            </a:extLst>
+          </p:cNvPr>
+          <p:cNvSpPr/>
+          <p:nvPr/>
+        </p:nvSpPr>
+        <p:spPr>
+          <a:xfrm>
+            <a:off x="7644384" y="5059679"/>
+            <a:ext cx="707136" cy="810769"/>
+          </a:xfrm>
+          <a:prstGeom prst="roundRect">
+            <a:avLst/>
+          </a:prstGeom>
+          <a:solidFill>
+            <a:schemeClr val="accent2">
+              <a:alpha val="50000"/>
+            </a:schemeClr>
+          </a:solidFill>
+          <a:ln>
+            <a:noFill/>
+          </a:ln>
+        </p:spPr>
+        <p:style>
+          <a:lnRef idx="0">
+            <a:scrgbClr r="0" g="0" b="0"/>
+          </a:lnRef>
+          <a:fillRef idx="0">
+            <a:scrgbClr r="0" g="0" b="0"/>
+          </a:fillRef>
+          <a:effectRef idx="0">
+            <a:scrgbClr r="0" g="0" b="0"/>
+          </a:effectRef>
+          <a:fontRef idx="minor">
+            <a:schemeClr val="lt1"/>
+          </a:fontRef>
+        </p:style>
+        <p:txBody>
+          <a:bodyPr rtlCol="0" anchor="ctr"/>
+          <a:lstStyle/>
+          <a:p>
+            <a:pPr algn="ctr"/>
+            <a:endParaRPr lang="en-NL"/>
+          </a:p>
+        </p:txBody>
+      </p:sp>
+      <p:sp>
+        <p:nvSpPr>
+          <p:cNvPr id="12" name="Rectangle: Rounded Corners 11">
+            <a:extLst>
+              <a:ext uri="{FF2B5EF4-FFF2-40B4-BE49-F238E27FC236}">
+                <a16:creationId xmlns:a16="http://schemas.microsoft.com/office/drawing/2014/main" id="{ABF13946-8309-C278-762F-79F3C3F278B0}"/>
+              </a:ext>
+            </a:extLst>
+          </p:cNvPr>
+          <p:cNvSpPr/>
+          <p:nvPr/>
+        </p:nvSpPr>
+        <p:spPr>
+          <a:xfrm>
+            <a:off x="7644384" y="5931005"/>
+            <a:ext cx="707136" cy="810769"/>
+          </a:xfrm>
+          <a:prstGeom prst="roundRect">
+            <a:avLst/>
+          </a:prstGeom>
+          <a:solidFill>
+            <a:schemeClr val="accent2">
+              <a:alpha val="50000"/>
+            </a:schemeClr>
+          </a:solidFill>
+          <a:ln>
+            <a:noFill/>
+          </a:ln>
+        </p:spPr>
+        <p:style>
+          <a:lnRef idx="0">
+            <a:scrgbClr r="0" g="0" b="0"/>
+          </a:lnRef>
+          <a:fillRef idx="0">
+            <a:scrgbClr r="0" g="0" b="0"/>
+          </a:fillRef>
+          <a:effectRef idx="0">
+            <a:scrgbClr r="0" g="0" b="0"/>
+          </a:effectRef>
+          <a:fontRef idx="minor">
+            <a:schemeClr val="lt1"/>
+          </a:fontRef>
+        </p:style>
+        <p:txBody>
+          <a:bodyPr rtlCol="0" anchor="ctr"/>
+          <a:lstStyle/>
+          <a:p>
+            <a:pPr algn="ctr"/>
+            <a:endParaRPr lang="en-NL"/>
+          </a:p>
+        </p:txBody>
+      </p:sp>
+      <p:sp>
+        <p:nvSpPr>
+          <p:cNvPr id="13" name="Rectangle: Rounded Corners 12">
+            <a:extLst>
+              <a:ext uri="{FF2B5EF4-FFF2-40B4-BE49-F238E27FC236}">
+                <a16:creationId xmlns:a16="http://schemas.microsoft.com/office/drawing/2014/main" id="{198BABE6-C9EC-921D-5CF8-D104B0C97936}"/>
+              </a:ext>
+            </a:extLst>
+          </p:cNvPr>
+          <p:cNvSpPr/>
+          <p:nvPr/>
+        </p:nvSpPr>
+        <p:spPr>
+          <a:xfrm>
+            <a:off x="1584960" y="5654531"/>
+            <a:ext cx="713232" cy="810769"/>
+          </a:xfrm>
+          <a:prstGeom prst="roundRect">
+            <a:avLst/>
+          </a:prstGeom>
+          <a:solidFill>
+            <a:schemeClr val="accent2">
+              <a:alpha val="50000"/>
+            </a:schemeClr>
+          </a:solidFill>
+          <a:ln>
+            <a:noFill/>
+          </a:ln>
+        </p:spPr>
+        <p:style>
+          <a:lnRef idx="0">
+            <a:scrgbClr r="0" g="0" b="0"/>
+          </a:lnRef>
+          <a:fillRef idx="0">
+            <a:scrgbClr r="0" g="0" b="0"/>
+          </a:fillRef>
+          <a:effectRef idx="0">
+            <a:scrgbClr r="0" g="0" b="0"/>
+          </a:effectRef>
+          <a:fontRef idx="minor">
+            <a:schemeClr val="lt1"/>
+          </a:fontRef>
+        </p:style>
+        <p:txBody>
+          <a:bodyPr rtlCol="0" anchor="ctr"/>
+          <a:lstStyle/>
+          <a:p>
+            <a:pPr algn="ctr"/>
+            <a:endParaRPr lang="en-NL"/>
+          </a:p>
+        </p:txBody>
+      </p:sp>
+      <p:sp>
+        <p:nvSpPr>
+          <p:cNvPr id="14" name="Rectangle: Rounded Corners 13">
+            <a:extLst>
+              <a:ext uri="{FF2B5EF4-FFF2-40B4-BE49-F238E27FC236}">
+                <a16:creationId xmlns:a16="http://schemas.microsoft.com/office/drawing/2014/main" id="{BCC3A3C3-B269-98E4-DD3A-CB1B7F5A819E}"/>
+              </a:ext>
+            </a:extLst>
+          </p:cNvPr>
+          <p:cNvSpPr/>
+          <p:nvPr/>
+        </p:nvSpPr>
+        <p:spPr>
+          <a:xfrm>
+            <a:off x="1584960" y="4767563"/>
+            <a:ext cx="713232" cy="810769"/>
+          </a:xfrm>
+          <a:prstGeom prst="roundRect">
+            <a:avLst/>
+          </a:prstGeom>
+          <a:solidFill>
+            <a:schemeClr val="accent2">
+              <a:alpha val="50000"/>
+            </a:schemeClr>
+          </a:solidFill>
+          <a:ln>
+            <a:noFill/>
+          </a:ln>
+        </p:spPr>
+        <p:style>
+          <a:lnRef idx="0">
+            <a:scrgbClr r="0" g="0" b="0"/>
+          </a:lnRef>
+          <a:fillRef idx="0">
+            <a:scrgbClr r="0" g="0" b="0"/>
+          </a:fillRef>
+          <a:effectRef idx="0">
+            <a:scrgbClr r="0" g="0" b="0"/>
+          </a:effectRef>
+          <a:fontRef idx="minor">
+            <a:schemeClr val="lt1"/>
+          </a:fontRef>
+        </p:style>
+        <p:txBody>
+          <a:bodyPr rtlCol="0" anchor="ctr"/>
+          <a:lstStyle/>
+          <a:p>
+            <a:pPr algn="ctr"/>
+            <a:endParaRPr lang="en-NL"/>
+          </a:p>
+        </p:txBody>
+      </p:sp>
+      <p:sp>
+        <p:nvSpPr>
+          <p:cNvPr id="15" name="Rectangle: Rounded Corners 14">
+            <a:extLst>
+              <a:ext uri="{FF2B5EF4-FFF2-40B4-BE49-F238E27FC236}">
+                <a16:creationId xmlns:a16="http://schemas.microsoft.com/office/drawing/2014/main" id="{E14488B4-7395-C14E-865C-9FD688B1820F}"/>
+              </a:ext>
+            </a:extLst>
+          </p:cNvPr>
+          <p:cNvSpPr/>
+          <p:nvPr/>
+        </p:nvSpPr>
+        <p:spPr>
+          <a:xfrm>
+            <a:off x="2350736" y="3868403"/>
+            <a:ext cx="713232" cy="810769"/>
+          </a:xfrm>
+          <a:prstGeom prst="roundRect">
+            <a:avLst/>
+          </a:prstGeom>
+          <a:solidFill>
+            <a:schemeClr val="accent2">
+              <a:alpha val="50000"/>
+            </a:schemeClr>
+          </a:solidFill>
+          <a:ln>
+            <a:noFill/>
+          </a:ln>
+        </p:spPr>
+        <p:style>
+          <a:lnRef idx="0">
+            <a:scrgbClr r="0" g="0" b="0"/>
+          </a:lnRef>
+          <a:fillRef idx="0">
+            <a:scrgbClr r="0" g="0" b="0"/>
+          </a:fillRef>
+          <a:effectRef idx="0">
+            <a:scrgbClr r="0" g="0" b="0"/>
+          </a:effectRef>
+          <a:fontRef idx="minor">
+            <a:schemeClr val="lt1"/>
+          </a:fontRef>
+        </p:style>
+        <p:txBody>
+          <a:bodyPr rtlCol="0" anchor="ctr"/>
+          <a:lstStyle/>
+          <a:p>
+            <a:pPr algn="ctr"/>
+            <a:endParaRPr lang="en-NL"/>
+          </a:p>
+        </p:txBody>
+      </p:sp>
+      <p:sp>
+        <p:nvSpPr>
+          <p:cNvPr id="16" name="Rectangle: Rounded Corners 15">
+            <a:extLst>
+              <a:ext uri="{FF2B5EF4-FFF2-40B4-BE49-F238E27FC236}">
+                <a16:creationId xmlns:a16="http://schemas.microsoft.com/office/drawing/2014/main" id="{70F79923-65BD-D203-42FA-5FFA5DB4B82B}"/>
+              </a:ext>
+            </a:extLst>
+          </p:cNvPr>
+          <p:cNvSpPr/>
+          <p:nvPr/>
+        </p:nvSpPr>
+        <p:spPr>
+          <a:xfrm>
+            <a:off x="2350736" y="2826417"/>
+            <a:ext cx="713232" cy="810769"/>
+          </a:xfrm>
+          <a:prstGeom prst="roundRect">
+            <a:avLst/>
+          </a:prstGeom>
+          <a:solidFill>
+            <a:schemeClr val="accent2">
+              <a:alpha val="50000"/>
+            </a:schemeClr>
+          </a:solidFill>
+          <a:ln>
+            <a:noFill/>
+          </a:ln>
+        </p:spPr>
+        <p:style>
+          <a:lnRef idx="0">
+            <a:scrgbClr r="0" g="0" b="0"/>
+          </a:lnRef>
+          <a:fillRef idx="0">
+            <a:scrgbClr r="0" g="0" b="0"/>
+          </a:fillRef>
+          <a:effectRef idx="0">
+            <a:scrgbClr r="0" g="0" b="0"/>
+          </a:effectRef>
+          <a:fontRef idx="minor">
+            <a:schemeClr val="lt1"/>
+          </a:fontRef>
+        </p:style>
+        <p:txBody>
+          <a:bodyPr rtlCol="0" anchor="ctr"/>
+          <a:lstStyle/>
+          <a:p>
+            <a:pPr algn="ctr"/>
+            <a:endParaRPr lang="en-NL"/>
           </a:p>
         </p:txBody>
       </p:sp>
@@ -6737,8 +7412,27 @@
           </a:p>
           <a:p>
             <a:r>
+              <a:rPr lang="en-US" dirty="0" err="1"/>
+              <a:t>architectuur</a:t>
+            </a:r>
+            <a:endParaRPr lang="en-US" dirty="0"/>
+          </a:p>
+          <a:p>
+            <a:r>
               <a:rPr lang="en-US" dirty="0"/>
               <a:t>Semester achievements</a:t>
+            </a:r>
+          </a:p>
+          <a:p>
+            <a:r>
+              <a:rPr lang="en-US" dirty="0"/>
+              <a:t>Demo</a:t>
+            </a:r>
+          </a:p>
+          <a:p>
+            <a:r>
+              <a:rPr lang="en-US" dirty="0"/>
+              <a:t>Self assessment</a:t>
             </a:r>
           </a:p>
           <a:p>
@@ -6876,6 +7570,28 @@
 <file path=ppt/slides/slide4.xml><?xml version="1.0" encoding="utf-8"?>
 <p:sld xmlns:a="http://schemas.openxmlformats.org/drawingml/2006/main" xmlns:r="http://schemas.openxmlformats.org/officeDocument/2006/relationships" xmlns:p="http://schemas.openxmlformats.org/presentationml/2006/main">
   <p:cSld>
+    <p:bg>
+      <p:bgPr>
+        <a:gradFill rotWithShape="1">
+          <a:gsLst>
+            <a:gs pos="0">
+              <a:schemeClr val="bg1">
+                <a:tint val="90000"/>
+                <a:lumMod val="110000"/>
+              </a:schemeClr>
+            </a:gs>
+            <a:gs pos="100000">
+              <a:schemeClr val="bg1">
+                <a:shade val="64000"/>
+                <a:lumMod val="88000"/>
+              </a:schemeClr>
+            </a:gs>
+          </a:gsLst>
+          <a:lin ang="5400000" scaled="0"/>
+        </a:gradFill>
+        <a:effectLst/>
+      </p:bgPr>
+    </p:bg>
     <p:spTree>
       <p:nvGrpSpPr>
         <p:cNvPr id="1" name=""/>
@@ -6890,12 +7606,174 @@
           <a:chExt cx="0" cy="0"/>
         </a:xfrm>
       </p:grpSpPr>
+      <p:pic>
+        <p:nvPicPr>
+          <p:cNvPr id="10" name="Picture 2">
+            <a:extLst>
+              <a:ext uri="{FF2B5EF4-FFF2-40B4-BE49-F238E27FC236}">
+                <a16:creationId xmlns:a16="http://schemas.microsoft.com/office/drawing/2014/main" id="{25496B42-CC46-4183-B481-887CD3E8C725}"/>
+              </a:ext>
+              <a:ext uri="{C183D7F6-B498-43B3-948B-1728B52AA6E4}">
+                <adec:decorative xmlns:adec="http://schemas.microsoft.com/office/drawing/2017/decorative" val="1"/>
+              </a:ext>
+            </a:extLst>
+          </p:cNvPr>
+          <p:cNvPicPr>
+            <a:picLocks noGrp="1" noRot="1" noChangeAspect="1" noMove="1" noResize="1" noEditPoints="1" noAdjustHandles="1" noChangeArrowheads="1" noChangeShapeType="1" noCrop="1"/>
+          </p:cNvPicPr>
+          <p:nvPr>
+            <p:extLst>
+              <p:ext uri="{386F3935-93C4-4BCD-93E2-E3B085C9AB24}">
+                <p16:designElem xmlns:p16="http://schemas.microsoft.com/office/powerpoint/2015/main" val="1"/>
+              </p:ext>
+            </p:extLst>
+          </p:nvPr>
+        </p:nvPicPr>
+        <p:blipFill>
+          <a:blip r:embed="rId2">
+            <a:alphaModFix/>
+            <a:extLst>
+              <a:ext uri="{28A0092B-C50C-407E-A947-70E740481C1C}">
+                <a14:useLocalDpi xmlns:a14="http://schemas.microsoft.com/office/drawing/2010/main" val="0"/>
+              </a:ext>
+            </a:extLst>
+          </a:blip>
+          <a:srcRect/>
+          <a:stretch>
+            <a:fillRect/>
+          </a:stretch>
+        </p:blipFill>
+        <p:spPr bwMode="auto">
+          <a:xfrm>
+            <a:off x="0" y="-1"/>
+            <a:ext cx="12192003" cy="6858001"/>
+          </a:xfrm>
+          <a:prstGeom prst="rect">
+            <a:avLst/>
+          </a:prstGeom>
+          <a:noFill/>
+          <a:extLst>
+            <a:ext uri="{909E8E84-426E-40DD-AFC4-6F175D3DCCD1}">
+              <a14:hiddenFill xmlns:a14="http://schemas.microsoft.com/office/drawing/2010/main">
+                <a:solidFill>
+                  <a:srgbClr val="FFFFFF"/>
+                </a:solidFill>
+              </a14:hiddenFill>
+            </a:ext>
+          </a:extLst>
+        </p:spPr>
+      </p:pic>
+      <p:pic>
+        <p:nvPicPr>
+          <p:cNvPr id="12" name="Picture 11">
+            <a:extLst>
+              <a:ext uri="{FF2B5EF4-FFF2-40B4-BE49-F238E27FC236}">
+                <a16:creationId xmlns:a16="http://schemas.microsoft.com/office/drawing/2014/main" id="{E2758CE0-F916-4DCE-88D1-71430BE441B2}"/>
+              </a:ext>
+              <a:ext uri="{C183D7F6-B498-43B3-948B-1728B52AA6E4}">
+                <adec:decorative xmlns:adec="http://schemas.microsoft.com/office/drawing/2017/decorative" val="1"/>
+              </a:ext>
+            </a:extLst>
+          </p:cNvPr>
+          <p:cNvPicPr>
+            <a:picLocks noGrp="1" noRot="1" noChangeAspect="1" noMove="1" noResize="1" noEditPoints="1" noAdjustHandles="1" noChangeArrowheads="1" noChangeShapeType="1" noCrop="1"/>
+          </p:cNvPicPr>
+          <p:nvPr>
+            <p:extLst>
+              <p:ext uri="{386F3935-93C4-4BCD-93E2-E3B085C9AB24}">
+                <p16:designElem xmlns:p16="http://schemas.microsoft.com/office/powerpoint/2015/main" val="1"/>
+              </p:ext>
+            </p:extLst>
+          </p:nvPr>
+        </p:nvPicPr>
+        <p:blipFill>
+          <a:blip r:embed="rId3">
+            <a:extLst>
+              <a:ext uri="{28A0092B-C50C-407E-A947-70E740481C1C}">
+                <a14:useLocalDpi xmlns:a14="http://schemas.microsoft.com/office/drawing/2010/main" val="0"/>
+              </a:ext>
+            </a:extLst>
+          </a:blip>
+          <a:stretch>
+            <a:fillRect/>
+          </a:stretch>
+        </p:blipFill>
+        <p:spPr>
+          <a:xfrm>
+            <a:off x="0" y="0"/>
+            <a:ext cx="12192000" cy="6858000"/>
+          </a:xfrm>
+          <a:prstGeom prst="rect">
+            <a:avLst/>
+          </a:prstGeom>
+        </p:spPr>
+      </p:pic>
+      <p:sp useBgFill="1">
+        <p:nvSpPr>
+          <p:cNvPr id="14" name="Rectangle 13">
+            <a:extLst>
+              <a:ext uri="{FF2B5EF4-FFF2-40B4-BE49-F238E27FC236}">
+                <a16:creationId xmlns:a16="http://schemas.microsoft.com/office/drawing/2014/main" id="{31CA2540-FD07-4286-91E4-8D0DE4E50979}"/>
+              </a:ext>
+              <a:ext uri="{C183D7F6-B498-43B3-948B-1728B52AA6E4}">
+                <adec:decorative xmlns:adec="http://schemas.microsoft.com/office/drawing/2017/decorative" val="1"/>
+              </a:ext>
+            </a:extLst>
+          </p:cNvPr>
+          <p:cNvSpPr>
+            <a:spLocks noGrp="1" noRot="1" noChangeAspect="1" noMove="1" noResize="1" noEditPoints="1" noAdjustHandles="1" noChangeArrowheads="1" noChangeShapeType="1" noTextEdit="1"/>
+          </p:cNvSpPr>
+          <p:nvPr>
+            <p:extLst>
+              <p:ext uri="{386F3935-93C4-4BCD-93E2-E3B085C9AB24}">
+                <p16:designElem xmlns:p16="http://schemas.microsoft.com/office/powerpoint/2015/main" val="1"/>
+              </p:ext>
+            </p:extLst>
+          </p:nvPr>
+        </p:nvSpPr>
+        <p:spPr>
+          <a:xfrm>
+            <a:off x="0" y="0"/>
+            <a:ext cx="12192000" cy="6858000"/>
+          </a:xfrm>
+          <a:prstGeom prst="rect">
+            <a:avLst/>
+          </a:prstGeom>
+          <a:ln>
+            <a:noFill/>
+          </a:ln>
+        </p:spPr>
+        <p:style>
+          <a:lnRef idx="2">
+            <a:schemeClr val="accent1">
+              <a:shade val="50000"/>
+            </a:schemeClr>
+          </a:lnRef>
+          <a:fillRef idx="1">
+            <a:schemeClr val="accent1"/>
+          </a:fillRef>
+          <a:effectRef idx="0">
+            <a:schemeClr val="accent1"/>
+          </a:effectRef>
+          <a:fontRef idx="minor">
+            <a:schemeClr val="lt1"/>
+          </a:fontRef>
+        </p:style>
+        <p:txBody>
+          <a:bodyPr rtlCol="0" anchor="ctr"/>
+          <a:lstStyle/>
+          <a:p>
+            <a:pPr algn="ctr"/>
+            <a:endParaRPr lang="en-US" dirty="0"/>
+          </a:p>
+        </p:txBody>
+      </p:sp>
       <p:sp>
         <p:nvSpPr>
           <p:cNvPr id="2" name="Title 1">
             <a:extLst>
               <a:ext uri="{FF2B5EF4-FFF2-40B4-BE49-F238E27FC236}">
-                <a16:creationId xmlns:a16="http://schemas.microsoft.com/office/drawing/2014/main" id="{AE39060A-7971-2B21-C875-0CAEE4BA4160}"/>
+                <a16:creationId xmlns:a16="http://schemas.microsoft.com/office/drawing/2014/main" id="{A5C3C9F0-7488-E966-5523-E6784317FF7D}"/>
               </a:ext>
             </a:extLst>
           </p:cNvPr>
@@ -6906,96 +7784,302 @@
             <p:ph type="title"/>
           </p:nvPr>
         </p:nvSpPr>
-        <p:spPr/>
-        <p:txBody>
-          <a:bodyPr/>
-          <a:lstStyle/>
-          <a:p>
-            <a:r>
-              <a:rPr lang="en-US" dirty="0"/>
-              <a:t>Semester achievements</a:t>
-            </a:r>
-            <a:endParaRPr lang="en-NL" dirty="0"/>
-          </a:p>
-        </p:txBody>
-      </p:sp>
-      <p:sp>
-        <p:nvSpPr>
-          <p:cNvPr id="3" name="Content Placeholder 2">
+        <p:spPr>
+          <a:xfrm>
+            <a:off x="-106943" y="-760956"/>
+            <a:ext cx="4328819" cy="2509213"/>
+          </a:xfrm>
+        </p:spPr>
+        <p:txBody>
+          <a:bodyPr vert="horz" lIns="91440" tIns="45720" rIns="91440" bIns="45720" rtlCol="0" anchor="b">
+            <a:normAutofit/>
+          </a:bodyPr>
+          <a:lstStyle/>
+          <a:p>
+            <a:r>
+              <a:rPr lang="en-US" sz="4800" dirty="0"/>
+              <a:t>Architectuur</a:t>
+            </a:r>
+          </a:p>
+        </p:txBody>
+      </p:sp>
+      <p:pic>
+        <p:nvPicPr>
+          <p:cNvPr id="16" name="Picture 15">
             <a:extLst>
               <a:ext uri="{FF2B5EF4-FFF2-40B4-BE49-F238E27FC236}">
-                <a16:creationId xmlns:a16="http://schemas.microsoft.com/office/drawing/2014/main" id="{0ED2257C-BFD6-669E-F36B-938388D45394}"/>
+                <a16:creationId xmlns:a16="http://schemas.microsoft.com/office/drawing/2014/main" id="{214924F5-CDC2-4DFA-82F3-4843ADD678A7}"/>
+              </a:ext>
+              <a:ext uri="{C183D7F6-B498-43B3-948B-1728B52AA6E4}">
+                <adec:decorative xmlns:adec="http://schemas.microsoft.com/office/drawing/2017/decorative" val="1"/>
               </a:ext>
             </a:extLst>
           </p:cNvPr>
-          <p:cNvSpPr>
-            <a:spLocks noGrp="1"/>
-          </p:cNvSpPr>
+          <p:cNvPicPr>
+            <a:picLocks noGrp="1" noRot="1" noChangeAspect="1" noMove="1" noResize="1" noEditPoints="1" noAdjustHandles="1" noChangeArrowheads="1" noChangeShapeType="1" noCrop="1"/>
+          </p:cNvPicPr>
+          <p:nvPr>
+            <p:extLst>
+              <p:ext uri="{386F3935-93C4-4BCD-93E2-E3B085C9AB24}">
+                <p16:designElem xmlns:p16="http://schemas.microsoft.com/office/powerpoint/2015/main" val="1"/>
+              </p:ext>
+            </p:extLst>
+          </p:nvPr>
+        </p:nvPicPr>
+        <p:blipFill rotWithShape="1">
+          <a:blip r:embed="rId4">
+            <a:extLst>
+              <a:ext uri="{28A0092B-C50C-407E-A947-70E740481C1C}">
+                <a14:useLocalDpi xmlns:a14="http://schemas.microsoft.com/office/drawing/2010/main" val="0"/>
+              </a:ext>
+            </a:extLst>
+          </a:blip>
+          <a:srcRect l="55295" t="89389" r="26987" b="24"/>
+          <a:stretch/>
+        </p:blipFill>
+        <p:spPr>
+          <a:xfrm flipH="1">
+            <a:off x="0" y="-1"/>
+            <a:ext cx="2596444" cy="872709"/>
+          </a:xfrm>
+          <a:prstGeom prst="rect">
+            <a:avLst/>
+          </a:prstGeom>
+        </p:spPr>
+      </p:pic>
+      <p:pic>
+        <p:nvPicPr>
+          <p:cNvPr id="18" name="Picture 17">
+            <a:extLst>
+              <a:ext uri="{FF2B5EF4-FFF2-40B4-BE49-F238E27FC236}">
+                <a16:creationId xmlns:a16="http://schemas.microsoft.com/office/drawing/2014/main" id="{AED59812-6820-446C-B994-0D059C97DC3F}"/>
+              </a:ext>
+              <a:ext uri="{C183D7F6-B498-43B3-948B-1728B52AA6E4}">
+                <adec:decorative xmlns:adec="http://schemas.microsoft.com/office/drawing/2017/decorative" val="1"/>
+              </a:ext>
+            </a:extLst>
+          </p:cNvPr>
+          <p:cNvPicPr>
+            <a:picLocks noGrp="1" noRot="1" noChangeAspect="1" noMove="1" noResize="1" noEditPoints="1" noAdjustHandles="1" noChangeArrowheads="1" noChangeShapeType="1" noCrop="1"/>
+          </p:cNvPicPr>
+          <p:nvPr>
+            <p:extLst>
+              <p:ext uri="{386F3935-93C4-4BCD-93E2-E3B085C9AB24}">
+                <p16:designElem xmlns:p16="http://schemas.microsoft.com/office/powerpoint/2015/main" val="1"/>
+              </p:ext>
+            </p:extLst>
+          </p:nvPr>
+        </p:nvPicPr>
+        <p:blipFill rotWithShape="1">
+          <a:blip r:embed="rId4">
+            <a:extLst>
+              <a:ext uri="{28A0092B-C50C-407E-A947-70E740481C1C}">
+                <a14:useLocalDpi xmlns:a14="http://schemas.microsoft.com/office/drawing/2010/main" val="0"/>
+              </a:ext>
+            </a:extLst>
+          </a:blip>
+          <a:srcRect l="91927" t="72411" b="13751"/>
+          <a:stretch/>
+        </p:blipFill>
+        <p:spPr>
+          <a:xfrm>
+            <a:off x="10473994" y="5564567"/>
+            <a:ext cx="1341545" cy="1293433"/>
+          </a:xfrm>
+          <a:custGeom>
+            <a:avLst/>
+            <a:gdLst>
+              <a:gd name="connsiteX0" fmla="*/ 0 w 1341545"/>
+              <a:gd name="connsiteY0" fmla="*/ 0 h 1293433"/>
+              <a:gd name="connsiteX1" fmla="*/ 1341545 w 1341545"/>
+              <a:gd name="connsiteY1" fmla="*/ 0 h 1293433"/>
+              <a:gd name="connsiteX2" fmla="*/ 1341545 w 1341545"/>
+              <a:gd name="connsiteY2" fmla="*/ 1293433 h 1293433"/>
+              <a:gd name="connsiteX3" fmla="*/ 150847 w 1341545"/>
+              <a:gd name="connsiteY3" fmla="*/ 1293433 h 1293433"/>
+              <a:gd name="connsiteX4" fmla="*/ 66240 w 1341545"/>
+              <a:gd name="connsiteY4" fmla="*/ 1183451 h 1293433"/>
+              <a:gd name="connsiteX5" fmla="*/ 0 w 1341545"/>
+              <a:gd name="connsiteY5" fmla="*/ 1061841 h 1293433"/>
+            </a:gdLst>
+            <a:ahLst/>
+            <a:cxnLst>
+              <a:cxn ang="0">
+                <a:pos x="connsiteX0" y="connsiteY0"/>
+              </a:cxn>
+              <a:cxn ang="0">
+                <a:pos x="connsiteX1" y="connsiteY1"/>
+              </a:cxn>
+              <a:cxn ang="0">
+                <a:pos x="connsiteX2" y="connsiteY2"/>
+              </a:cxn>
+              <a:cxn ang="0">
+                <a:pos x="connsiteX3" y="connsiteY3"/>
+              </a:cxn>
+              <a:cxn ang="0">
+                <a:pos x="connsiteX4" y="connsiteY4"/>
+              </a:cxn>
+              <a:cxn ang="0">
+                <a:pos x="connsiteX5" y="connsiteY5"/>
+              </a:cxn>
+            </a:cxnLst>
+            <a:rect l="l" t="t" r="r" b="b"/>
+            <a:pathLst>
+              <a:path w="1341545" h="1293433">
+                <a:moveTo>
+                  <a:pt x="0" y="0"/>
+                </a:moveTo>
+                <a:lnTo>
+                  <a:pt x="1341545" y="0"/>
+                </a:lnTo>
+                <a:lnTo>
+                  <a:pt x="1341545" y="1293433"/>
+                </a:lnTo>
+                <a:lnTo>
+                  <a:pt x="150847" y="1293433"/>
+                </a:lnTo>
+                <a:lnTo>
+                  <a:pt x="66240" y="1183451"/>
+                </a:lnTo>
+                <a:lnTo>
+                  <a:pt x="0" y="1061841"/>
+                </a:lnTo>
+                <a:close/>
+              </a:path>
+            </a:pathLst>
+          </a:custGeom>
+        </p:spPr>
+      </p:pic>
+      <p:pic>
+        <p:nvPicPr>
+          <p:cNvPr id="20" name="Picture 19">
+            <a:extLst>
+              <a:ext uri="{FF2B5EF4-FFF2-40B4-BE49-F238E27FC236}">
+                <a16:creationId xmlns:a16="http://schemas.microsoft.com/office/drawing/2014/main" id="{E844ED7C-1917-40D8-8B42-1B1C27BC5A54}"/>
+              </a:ext>
+              <a:ext uri="{C183D7F6-B498-43B3-948B-1728B52AA6E4}">
+                <adec:decorative xmlns:adec="http://schemas.microsoft.com/office/drawing/2017/decorative" val="1"/>
+              </a:ext>
+            </a:extLst>
+          </p:cNvPr>
+          <p:cNvPicPr>
+            <a:picLocks noGrp="1" noRot="1" noChangeAspect="1" noMove="1" noResize="1" noEditPoints="1" noAdjustHandles="1" noChangeArrowheads="1" noChangeShapeType="1" noCrop="1"/>
+          </p:cNvPicPr>
+          <p:nvPr>
+            <p:extLst>
+              <p:ext uri="{386F3935-93C4-4BCD-93E2-E3B085C9AB24}">
+                <p16:designElem xmlns:p16="http://schemas.microsoft.com/office/powerpoint/2015/main" val="1"/>
+              </p:ext>
+            </p:extLst>
+          </p:nvPr>
+        </p:nvPicPr>
+        <p:blipFill rotWithShape="1">
+          <a:blip r:embed="rId3">
+            <a:extLst>
+              <a:ext uri="{28A0092B-C50C-407E-A947-70E740481C1C}">
+                <a14:useLocalDpi xmlns:a14="http://schemas.microsoft.com/office/drawing/2010/main" val="0"/>
+              </a:ext>
+            </a:extLst>
+          </a:blip>
+          <a:srcRect l="73623" t="43915" r="1" b="18252"/>
+          <a:stretch/>
+        </p:blipFill>
+        <p:spPr>
+          <a:xfrm flipH="1">
+            <a:off x="0" y="3142319"/>
+            <a:ext cx="4605339" cy="3715682"/>
+          </a:xfrm>
+          <a:prstGeom prst="rect">
+            <a:avLst/>
+          </a:prstGeom>
+        </p:spPr>
+      </p:pic>
+      <p:sp>
+        <p:nvSpPr>
+          <p:cNvPr id="6" name="Rectangle 5">
+            <a:extLst>
+              <a:ext uri="{FF2B5EF4-FFF2-40B4-BE49-F238E27FC236}">
+                <a16:creationId xmlns:a16="http://schemas.microsoft.com/office/drawing/2014/main" id="{C86726FE-10E5-036C-AA11-E9B225528C30}"/>
+              </a:ext>
+            </a:extLst>
+          </p:cNvPr>
+          <p:cNvSpPr/>
+          <p:nvPr/>
+        </p:nvSpPr>
+        <p:spPr>
+          <a:xfrm>
+            <a:off x="3962400" y="363794"/>
+            <a:ext cx="8141109" cy="6243483"/>
+          </a:xfrm>
+          <a:prstGeom prst="rect">
+            <a:avLst/>
+          </a:prstGeom>
+        </p:spPr>
+        <p:style>
+          <a:lnRef idx="1">
+            <a:schemeClr val="dk1"/>
+          </a:lnRef>
+          <a:fillRef idx="2">
+            <a:schemeClr val="dk1"/>
+          </a:fillRef>
+          <a:effectRef idx="1">
+            <a:schemeClr val="dk1"/>
+          </a:effectRef>
+          <a:fontRef idx="minor">
+            <a:schemeClr val="dk1"/>
+          </a:fontRef>
+        </p:style>
+        <p:txBody>
+          <a:bodyPr rtlCol="0" anchor="ctr"/>
+          <a:lstStyle/>
+          <a:p>
+            <a:pPr algn="ctr"/>
+            <a:endParaRPr lang="en-NL"/>
+          </a:p>
+        </p:txBody>
+      </p:sp>
+      <p:pic>
+        <p:nvPicPr>
+          <p:cNvPr id="5" name="Content Placeholder 4" descr="A picture containing text, screenshot, software, design&#10;&#10;Description automatically generated">
+            <a:extLst>
+              <a:ext uri="{FF2B5EF4-FFF2-40B4-BE49-F238E27FC236}">
+                <a16:creationId xmlns:a16="http://schemas.microsoft.com/office/drawing/2014/main" id="{EF833684-6D54-C221-1721-956580EBF2F7}"/>
+              </a:ext>
+            </a:extLst>
+          </p:cNvPr>
+          <p:cNvPicPr>
+            <a:picLocks noGrp="1" noChangeAspect="1"/>
+          </p:cNvPicPr>
           <p:nvPr>
             <p:ph sz="quarter" idx="13"/>
           </p:nvPr>
-        </p:nvSpPr>
-        <p:spPr/>
-        <p:txBody>
-          <a:bodyPr/>
-          <a:lstStyle/>
-          <a:p>
-            <a:r>
-              <a:rPr lang="en-US" dirty="0"/>
-              <a:t>Kubernetes in online </a:t>
-            </a:r>
-            <a:r>
-              <a:rPr lang="en-US" dirty="0" err="1"/>
-              <a:t>omgeving</a:t>
-            </a:r>
-            <a:endParaRPr lang="en-US" dirty="0"/>
-          </a:p>
-          <a:p>
-            <a:r>
-              <a:rPr lang="en-US" dirty="0"/>
-              <a:t>Read/write databases split</a:t>
-            </a:r>
-          </a:p>
-          <a:p>
-            <a:r>
-              <a:rPr lang="en-US" dirty="0"/>
-              <a:t>load </a:t>
-            </a:r>
-            <a:r>
-              <a:rPr lang="en-US" dirty="0" err="1"/>
-              <a:t>TEsting</a:t>
-            </a:r>
-            <a:endParaRPr lang="en-US" dirty="0"/>
-          </a:p>
-          <a:p>
-            <a:r>
-              <a:rPr lang="en-US" dirty="0"/>
-              <a:t>GDPR </a:t>
-            </a:r>
-            <a:r>
-              <a:rPr lang="en-US" dirty="0" err="1"/>
-              <a:t>Functionaliteit</a:t>
-            </a:r>
-            <a:endParaRPr lang="en-US" dirty="0"/>
-          </a:p>
-          <a:p>
-            <a:r>
-              <a:rPr lang="en-US" dirty="0"/>
-              <a:t>Function as a service</a:t>
-            </a:r>
-          </a:p>
-          <a:p>
-            <a:endParaRPr lang="en-US" dirty="0"/>
-          </a:p>
-          <a:p>
-            <a:endParaRPr lang="en-US" dirty="0"/>
-          </a:p>
-        </p:txBody>
-      </p:sp>
+        </p:nvPicPr>
+        <p:blipFill>
+          <a:blip r:embed="rId5">
+            <a:extLst>
+              <a:ext uri="{28A0092B-C50C-407E-A947-70E740481C1C}">
+                <a14:useLocalDpi xmlns:a14="http://schemas.microsoft.com/office/drawing/2010/main" val="0"/>
+              </a:ext>
+            </a:extLst>
+          </a:blip>
+          <a:stretch>
+            <a:fillRect/>
+          </a:stretch>
+        </p:blipFill>
+        <p:spPr>
+          <a:xfrm>
+            <a:off x="4063663" y="423112"/>
+            <a:ext cx="7951355" cy="6184165"/>
+          </a:xfrm>
+          <a:prstGeom prst="rect">
+            <a:avLst/>
+          </a:prstGeom>
+        </p:spPr>
+      </p:pic>
     </p:spTree>
     <p:extLst>
       <p:ext uri="{BB962C8B-B14F-4D97-AF65-F5344CB8AC3E}">
-        <p14:creationId xmlns:p14="http://schemas.microsoft.com/office/powerpoint/2010/main" val="481919589"/>
+        <p14:creationId xmlns:p14="http://schemas.microsoft.com/office/powerpoint/2010/main" val="8975106"/>
       </p:ext>
     </p:extLst>
   </p:cSld>
@@ -7090,6 +8174,19 @@
             <a:r>
               <a:rPr lang="en-US" dirty="0" err="1"/>
               <a:t>eerste</a:t>
+            </a:r>
+            <a:endParaRPr lang="en-US" dirty="0"/>
+          </a:p>
+          <a:p>
+            <a:r>
+              <a:rPr lang="en-US" dirty="0"/>
+              <a:t>Credits problem </a:t>
+            </a:r>
+            <a:r>
+              <a:rPr lang="en-US" dirty="0">
+                <a:sym typeface="Wingdings" panose="05000000000000000000" pitchFamily="2" charset="2"/>
+              </a:rPr>
+              <a:t></a:t>
             </a:r>
             <a:endParaRPr lang="en-US" dirty="0"/>
           </a:p>

</xml_diff>